<commit_message>
Update project05 - 기능 정의 - 형준.pptx
</commit_message>
<xml_diff>
--- a/1 기능 정의/project05 - 기능 정의 - 형준.pptx
+++ b/1 기능 정의/project05 - 기능 정의 - 형준.pptx
@@ -260,7 +260,7 @@
       </p15:sldGuideLst>
     </p:ext>
     <p:ext uri="http://customooxmlschemas.google.com/">
-      <go:slidesCustomData xmlns:go="http://customooxmlschemas.google.com/" xmlns:p15="http://schemas.microsoft.com/office/powerpoint/2012/main" xmlns:p14="http://schemas.microsoft.com/office/powerpoint/2010/main" xmlns:com="http://schemas.openxmlformats.org/drawingml/2006/compatibility" xmlns:pvml="urn:schemas-microsoft-com:office:powerpoint" xmlns:v="urn:schemas-microsoft-com:vml" xmlns:o="urn:schemas-microsoft-com:office:office" xmlns:dgm="http://schemas.openxmlformats.org/drawingml/2006/diagram" xmlns:c="http://schemas.openxmlformats.org/drawingml/2006/chart" xmlns:mv="urn:schemas-microsoft-com:mac:vml" xmlns:mc="http://schemas.openxmlformats.org/markup-compatibility/2006" xmlns="" r:id="rId13" roundtripDataSignature="AMtx7mj/88FBcqyPPfmGLIPH4pRldKDPVw=="/>
+      <go:slidesCustomData xmlns="" xmlns:mc="http://schemas.openxmlformats.org/markup-compatibility/2006" xmlns:mv="urn:schemas-microsoft-com:mac:vml" xmlns:c="http://schemas.openxmlformats.org/drawingml/2006/chart" xmlns:dgm="http://schemas.openxmlformats.org/drawingml/2006/diagram" xmlns:o="urn:schemas-microsoft-com:office:office" xmlns:v="urn:schemas-microsoft-com:vml" xmlns:pvml="urn:schemas-microsoft-com:office:powerpoint" xmlns:com="http://schemas.openxmlformats.org/drawingml/2006/compatibility" xmlns:p14="http://schemas.microsoft.com/office/powerpoint/2010/main" xmlns:p15="http://schemas.microsoft.com/office/powerpoint/2012/main" xmlns:go="http://customooxmlschemas.google.com/" r:id="rId13" roundtripDataSignature="AMtx7mj/88FBcqyPPfmGLIPH4pRldKDPVw=="/>
     </p:ext>
   </p:extLst>
 </p:presentation>
@@ -11788,97 +11788,387 @@
               <a:buNone/>
             </a:pPr>
             <a:r>
-              <a:rPr lang="ko-KR"/>
+              <a:rPr lang="ko-KR" dirty="0"/>
               <a:t>사용자 기능</a:t>
             </a:r>
-            <a:endParaRPr/>
+            <a:endParaRPr dirty="0"/>
           </a:p>
         </p:txBody>
       </p:sp>
       <p:sp>
         <p:nvSpPr>
-          <p:cNvPr id="91" name="Google Shape;91;p2"/>
-          <p:cNvSpPr txBox="1">
-            <a:spLocks noGrp="1"/>
-          </p:cNvSpPr>
-          <p:nvPr>
-            <p:ph type="body" idx="1"/>
-          </p:nvPr>
+          <p:cNvPr id="2" name="TextBox 1">
+            <a:extLst>
+              <a:ext uri="{FF2B5EF4-FFF2-40B4-BE49-F238E27FC236}">
+                <a16:creationId xmlns:a16="http://schemas.microsoft.com/office/drawing/2014/main" id="{7BDD9B11-7CA0-4D90-B193-5B705D84DE19}"/>
+              </a:ext>
+            </a:extLst>
+          </p:cNvPr>
+          <p:cNvSpPr txBox="1"/>
+          <p:nvPr/>
         </p:nvSpPr>
         <p:spPr>
           <a:xfrm>
-            <a:off x="838200" y="1409600"/>
-            <a:ext cx="10515600" cy="5212800"/>
+            <a:off x="1040859" y="2840477"/>
+            <a:ext cx="4066161" cy="2031325"/>
           </a:xfrm>
           <a:prstGeom prst="rect">
             <a:avLst/>
           </a:prstGeom>
           <a:noFill/>
-          <a:ln>
-            <a:noFill/>
-          </a:ln>
         </p:spPr>
         <p:txBody>
-          <a:bodyPr spcFirstLastPara="1" wrap="square" lIns="91425" tIns="45700" rIns="91425" bIns="45700" anchor="t" anchorCtr="0">
-            <a:normAutofit/>
+          <a:bodyPr wrap="square" rtlCol="0">
+            <a:spAutoFit/>
           </a:bodyPr>
           <a:lstStyle/>
           <a:p>
-            <a:pPr marL="0" lvl="0" indent="0" algn="l" rtl="0">
-              <a:lnSpc>
-                <a:spcPct val="90000"/>
-              </a:lnSpc>
-              <a:spcBef>
-                <a:spcPts val="0"/>
-              </a:spcBef>
-              <a:spcAft>
-                <a:spcPts val="0"/>
-              </a:spcAft>
-              <a:buClr>
-                <a:schemeClr val="dk1"/>
-              </a:buClr>
-              <a:buSzPts val="2800"/>
-              <a:buNone/>
+            <a:pPr marL="342900" indent="-342900">
+              <a:buAutoNum type="arabicPeriod"/>
             </a:pPr>
-            <a:endParaRPr sz="1800" dirty="0"/>
+            <a:r>
+              <a:rPr lang="ko-KR" altLang="en-US" dirty="0"/>
+              <a:t>장소 대관</a:t>
+            </a:r>
+            <a:endParaRPr lang="en-US" altLang="ko-KR" dirty="0"/>
           </a:p>
           <a:p>
-            <a:pPr marL="0" lvl="0" indent="0" algn="l" rtl="0">
-              <a:spcBef>
-                <a:spcPts val="0"/>
-              </a:spcBef>
-              <a:spcAft>
-                <a:spcPts val="0"/>
-              </a:spcAft>
-              <a:buClr>
-                <a:schemeClr val="dk1"/>
-              </a:buClr>
-              <a:buSzPts val="2800"/>
-              <a:buNone/>
+            <a:pPr marL="342900" indent="-342900">
+              <a:buAutoNum type="arabicPeriod"/>
             </a:pPr>
             <a:r>
-              <a:rPr lang="ko-KR" sz="1800" dirty="0"/>
-              <a:t>		</a:t>
+              <a:rPr lang="ko-KR" altLang="en-US" dirty="0"/>
+              <a:t>장소 대관 시 장소 선택</a:t>
+            </a:r>
+            <a:endParaRPr lang="en-US" altLang="ko-KR" dirty="0"/>
+          </a:p>
+          <a:p>
+            <a:pPr marL="342900" indent="-342900">
+              <a:buAutoNum type="arabicPeriod"/>
+            </a:pPr>
+            <a:r>
+              <a:rPr lang="ko-KR" altLang="en-US" dirty="0"/>
+              <a:t>날짜</a:t>
             </a:r>
             <a:r>
-              <a:rPr lang="ko-KR" sz="3000" b="1" dirty="0">
-                <a:latin typeface="Impact"/>
-                <a:ea typeface="Impact"/>
-                <a:cs typeface="Impact"/>
-                <a:sym typeface="Impact"/>
-              </a:rPr>
-              <a:t>사용자 </a:t>
+              <a:rPr lang="en-US" altLang="ko-KR" dirty="0"/>
+              <a:t>, </a:t>
             </a:r>
             <a:r>
-              <a:rPr lang="ko-KR" sz="3000" b="1" dirty="0" smtClean="0">
-                <a:latin typeface="Impact"/>
-                <a:ea typeface="Impact"/>
-                <a:cs typeface="Impact"/>
-                <a:sym typeface="Impact"/>
-              </a:rPr>
-              <a:t>공통</a:t>
+              <a:rPr lang="ko-KR" altLang="en-US" dirty="0"/>
+              <a:t>시간 선택 시간 단위는 </a:t>
             </a:r>
-            <a:endParaRPr sz="1800" dirty="0"/>
+            <a:r>
+              <a:rPr lang="en-US" altLang="ko-KR" dirty="0"/>
+              <a:t>2</a:t>
+            </a:r>
+            <a:r>
+              <a:rPr lang="ko-KR" altLang="en-US" dirty="0"/>
+              <a:t>시간</a:t>
+            </a:r>
+            <a:r>
+              <a:rPr lang="en-US" altLang="ko-KR" dirty="0"/>
+              <a:t>?</a:t>
+            </a:r>
+          </a:p>
+          <a:p>
+            <a:pPr marL="342900" indent="-342900">
+              <a:buAutoNum type="arabicPeriod"/>
+            </a:pPr>
+            <a:r>
+              <a:rPr lang="ko-KR" altLang="en-US" dirty="0"/>
+              <a:t>예약 전 문의 기능</a:t>
+            </a:r>
+            <a:r>
+              <a:rPr lang="en-US" altLang="ko-KR" dirty="0"/>
+              <a:t>(</a:t>
+            </a:r>
+            <a:r>
+              <a:rPr lang="ko-KR" altLang="en-US" dirty="0"/>
+              <a:t>시설에 대해 질문</a:t>
+            </a:r>
+            <a:r>
+              <a:rPr lang="en-US" altLang="ko-KR" dirty="0"/>
+              <a:t>)</a:t>
+            </a:r>
+          </a:p>
+          <a:p>
+            <a:pPr marL="342900" indent="-342900">
+              <a:buAutoNum type="arabicPeriod"/>
+            </a:pPr>
+            <a:r>
+              <a:rPr lang="ko-KR" altLang="en-US" dirty="0"/>
+              <a:t>대관취소</a:t>
+            </a:r>
+            <a:endParaRPr lang="en-US" altLang="ko-KR" dirty="0"/>
+          </a:p>
+          <a:p>
+            <a:pPr marL="342900" indent="-342900">
+              <a:buAutoNum type="arabicPeriod"/>
+            </a:pPr>
+            <a:r>
+              <a:rPr lang="ko-KR" altLang="en-US" dirty="0"/>
+              <a:t>결제</a:t>
+            </a:r>
+            <a:r>
+              <a:rPr lang="en-US" altLang="ko-KR" dirty="0"/>
+              <a:t>, </a:t>
+            </a:r>
+            <a:r>
+              <a:rPr lang="ko-KR" altLang="en-US" dirty="0"/>
+              <a:t>환불</a:t>
+            </a:r>
+            <a:r>
+              <a:rPr lang="en-US" altLang="ko-KR" dirty="0"/>
+              <a:t>?</a:t>
+            </a:r>
+          </a:p>
+          <a:p>
+            <a:pPr marL="342900" indent="-342900">
+              <a:buAutoNum type="arabicPeriod"/>
+            </a:pPr>
+            <a:r>
+              <a:rPr lang="ko-KR" altLang="en-US" dirty="0" err="1"/>
+              <a:t>강연장</a:t>
+            </a:r>
+            <a:r>
+              <a:rPr lang="ko-KR" altLang="en-US" dirty="0"/>
+              <a:t> 이용후기 등록</a:t>
+            </a:r>
+            <a:endParaRPr lang="en-US" altLang="ko-KR" dirty="0"/>
+          </a:p>
+          <a:p>
+            <a:pPr marL="342900" indent="-342900">
+              <a:buAutoNum type="arabicPeriod"/>
+            </a:pPr>
+            <a:r>
+              <a:rPr lang="ko-KR" altLang="en-US" dirty="0"/>
+              <a:t>강연 등록</a:t>
+            </a:r>
+            <a:endParaRPr lang="en-US" altLang="ko-KR" dirty="0"/>
+          </a:p>
+          <a:p>
+            <a:pPr marL="342900" indent="-342900">
+              <a:buAutoNum type="arabicPeriod"/>
+            </a:pPr>
+            <a:r>
+              <a:rPr lang="ko-KR" altLang="en-US" dirty="0"/>
+              <a:t>강연에 대한 문의 답변</a:t>
+            </a:r>
+            <a:endParaRPr lang="en-US" altLang="ko-KR" dirty="0"/>
+          </a:p>
+        </p:txBody>
+      </p:sp>
+      <p:sp>
+        <p:nvSpPr>
+          <p:cNvPr id="5" name="TextBox 4">
+            <a:extLst>
+              <a:ext uri="{FF2B5EF4-FFF2-40B4-BE49-F238E27FC236}">
+                <a16:creationId xmlns:a16="http://schemas.microsoft.com/office/drawing/2014/main" id="{6E3F13D9-CA96-4B19-87E5-4F0FB2A72201}"/>
+              </a:ext>
+            </a:extLst>
+          </p:cNvPr>
+          <p:cNvSpPr txBox="1"/>
+          <p:nvPr/>
+        </p:nvSpPr>
+        <p:spPr>
+          <a:xfrm>
+            <a:off x="5309679" y="2840477"/>
+            <a:ext cx="4066161" cy="1384995"/>
+          </a:xfrm>
+          <a:prstGeom prst="rect">
+            <a:avLst/>
+          </a:prstGeom>
+          <a:noFill/>
+        </p:spPr>
+        <p:txBody>
+          <a:bodyPr wrap="square" rtlCol="0">
+            <a:spAutoFit/>
+          </a:bodyPr>
+          <a:lstStyle/>
+          <a:p>
+            <a:pPr marL="342900" indent="-342900">
+              <a:buAutoNum type="arabicPeriod"/>
+            </a:pPr>
+            <a:r>
+              <a:rPr lang="ko-KR" altLang="en-US" dirty="0"/>
+              <a:t>강연 선택</a:t>
+            </a:r>
+            <a:endParaRPr lang="en-US" altLang="ko-KR" dirty="0"/>
+          </a:p>
+          <a:p>
+            <a:pPr marL="342900" indent="-342900">
+              <a:buAutoNum type="arabicPeriod"/>
+            </a:pPr>
+            <a:r>
+              <a:rPr lang="ko-KR" altLang="en-US" dirty="0"/>
+              <a:t>좌석 선택</a:t>
+            </a:r>
+            <a:endParaRPr lang="en-US" altLang="ko-KR" dirty="0"/>
+          </a:p>
+          <a:p>
+            <a:pPr marL="342900" indent="-342900">
+              <a:buAutoNum type="arabicPeriod"/>
+            </a:pPr>
+            <a:r>
+              <a:rPr lang="ko-KR" altLang="en-US" dirty="0"/>
+              <a:t>입장료 결제</a:t>
+            </a:r>
+            <a:endParaRPr lang="en-US" altLang="ko-KR" dirty="0"/>
+          </a:p>
+          <a:p>
+            <a:pPr marL="342900" indent="-342900">
+              <a:buAutoNum type="arabicPeriod"/>
+            </a:pPr>
+            <a:r>
+              <a:rPr lang="ko-KR" altLang="en-US" dirty="0"/>
+              <a:t>취소</a:t>
+            </a:r>
+            <a:r>
+              <a:rPr lang="en-US" altLang="ko-KR" dirty="0"/>
+              <a:t>, </a:t>
+            </a:r>
+            <a:r>
+              <a:rPr lang="ko-KR" altLang="en-US" dirty="0"/>
+              <a:t>환불</a:t>
+            </a:r>
+            <a:endParaRPr lang="en-US" altLang="ko-KR" dirty="0"/>
+          </a:p>
+          <a:p>
+            <a:pPr marL="342900" indent="-342900">
+              <a:buAutoNum type="arabicPeriod"/>
+            </a:pPr>
+            <a:r>
+              <a:rPr lang="ko-KR" altLang="en-US" dirty="0"/>
+              <a:t>강연 문의</a:t>
+            </a:r>
+            <a:r>
+              <a:rPr lang="en-US" altLang="ko-KR" dirty="0"/>
+              <a:t>(</a:t>
+            </a:r>
+            <a:r>
+              <a:rPr lang="ko-KR" altLang="en-US" dirty="0"/>
+              <a:t>강연을 등록한 사람에게 문의</a:t>
+            </a:r>
+            <a:r>
+              <a:rPr lang="en-US" altLang="ko-KR" dirty="0"/>
+              <a:t>)</a:t>
+            </a:r>
+          </a:p>
+          <a:p>
+            <a:pPr marL="342900" indent="-342900">
+              <a:buAutoNum type="arabicPeriod"/>
+            </a:pPr>
+            <a:r>
+              <a:rPr lang="ko-KR" altLang="en-US" dirty="0"/>
+              <a:t>강연 후기 등록</a:t>
+            </a:r>
+            <a:endParaRPr lang="en-US" altLang="ko-KR" dirty="0"/>
+          </a:p>
+        </p:txBody>
+      </p:sp>
+      <p:sp>
+        <p:nvSpPr>
+          <p:cNvPr id="8" name="TextBox 7">
+            <a:extLst>
+              <a:ext uri="{FF2B5EF4-FFF2-40B4-BE49-F238E27FC236}">
+                <a16:creationId xmlns:a16="http://schemas.microsoft.com/office/drawing/2014/main" id="{ADBAEE55-EEA0-4505-8BBF-EB1245D39AE0}"/>
+              </a:ext>
+            </a:extLst>
+          </p:cNvPr>
+          <p:cNvSpPr txBox="1"/>
+          <p:nvPr/>
+        </p:nvSpPr>
+        <p:spPr>
+          <a:xfrm>
+            <a:off x="5776607" y="1076441"/>
+            <a:ext cx="4066161" cy="1384995"/>
+          </a:xfrm>
+          <a:prstGeom prst="rect">
+            <a:avLst/>
+          </a:prstGeom>
+          <a:noFill/>
+        </p:spPr>
+        <p:txBody>
+          <a:bodyPr wrap="square" rtlCol="0">
+            <a:spAutoFit/>
+          </a:bodyPr>
+          <a:lstStyle/>
+          <a:p>
+            <a:pPr marL="342900" indent="-342900">
+              <a:buAutoNum type="arabicPeriod"/>
+            </a:pPr>
+            <a:r>
+              <a:rPr lang="ko-KR" altLang="en-US" dirty="0"/>
+              <a:t>회원가입</a:t>
+            </a:r>
+            <a:endParaRPr lang="en-US" altLang="ko-KR" dirty="0"/>
+          </a:p>
+          <a:p>
+            <a:pPr marL="342900" indent="-342900">
+              <a:buAutoNum type="arabicPeriod"/>
+            </a:pPr>
+            <a:r>
+              <a:rPr lang="ko-KR" altLang="en-US" dirty="0"/>
+              <a:t>로그인</a:t>
+            </a:r>
+            <a:endParaRPr lang="en-US" altLang="ko-KR" dirty="0"/>
+          </a:p>
+          <a:p>
+            <a:pPr marL="342900" indent="-342900">
+              <a:buAutoNum type="arabicPeriod"/>
+            </a:pPr>
+            <a:r>
+              <a:rPr lang="ko-KR" altLang="en-US" dirty="0"/>
+              <a:t>회원탈퇴</a:t>
+            </a:r>
+            <a:endParaRPr lang="en-US" altLang="ko-KR" dirty="0"/>
+          </a:p>
+          <a:p>
+            <a:pPr marL="342900" indent="-342900">
+              <a:buAutoNum type="arabicPeriod"/>
+            </a:pPr>
+            <a:r>
+              <a:rPr lang="ko-KR" altLang="en-US" dirty="0"/>
+              <a:t>공지사항</a:t>
+            </a:r>
+            <a:r>
+              <a:rPr lang="en-US" altLang="ko-KR" dirty="0"/>
+              <a:t>, FAQ</a:t>
+            </a:r>
+            <a:r>
+              <a:rPr lang="ko-KR" altLang="en-US" dirty="0"/>
+              <a:t>확인</a:t>
+            </a:r>
+            <a:endParaRPr lang="en-US" altLang="ko-KR" dirty="0"/>
+          </a:p>
+          <a:p>
+            <a:pPr marL="342900" indent="-342900">
+              <a:buAutoNum type="arabicPeriod"/>
+            </a:pPr>
+            <a:r>
+              <a:rPr lang="ko-KR" altLang="en-US" dirty="0"/>
+              <a:t>추천 강연 확인</a:t>
+            </a:r>
+            <a:endParaRPr lang="en-US" altLang="ko-KR" dirty="0"/>
+          </a:p>
+          <a:p>
+            <a:pPr marL="342900" indent="-342900">
+              <a:buAutoNum type="arabicPeriod"/>
+            </a:pPr>
+            <a:r>
+              <a:rPr lang="ko-KR" altLang="en-US" dirty="0"/>
+              <a:t>서비스 사용 관련 </a:t>
+            </a:r>
+            <a:r>
+              <a:rPr lang="en-US" altLang="ko-KR" dirty="0"/>
+              <a:t>Q&amp;A </a:t>
+            </a:r>
+            <a:r>
+              <a:rPr lang="ko-KR" altLang="en-US" dirty="0"/>
+              <a:t>등록 및 확인</a:t>
+            </a:r>
+            <a:endParaRPr lang="en-US" altLang="ko-KR" dirty="0"/>
           </a:p>
         </p:txBody>
       </p:sp>
@@ -11963,47 +12253,196 @@
       </p:sp>
       <p:sp>
         <p:nvSpPr>
-          <p:cNvPr id="109" name="Google Shape;109;p3"/>
-          <p:cNvSpPr txBox="1">
-            <a:spLocks noGrp="1"/>
-          </p:cNvSpPr>
-          <p:nvPr>
-            <p:ph type="body" idx="1"/>
-          </p:nvPr>
+          <p:cNvPr id="2" name="TextBox 1">
+            <a:extLst>
+              <a:ext uri="{FF2B5EF4-FFF2-40B4-BE49-F238E27FC236}">
+                <a16:creationId xmlns:a16="http://schemas.microsoft.com/office/drawing/2014/main" id="{7373C0CB-2D5E-4F70-9ED8-177D8FFF6A9A}"/>
+              </a:ext>
+            </a:extLst>
+          </p:cNvPr>
+          <p:cNvSpPr txBox="1"/>
+          <p:nvPr/>
         </p:nvSpPr>
         <p:spPr>
           <a:xfrm>
-            <a:off x="838200" y="1825625"/>
-            <a:ext cx="10515600" cy="4351338"/>
+            <a:off x="838199" y="1848255"/>
+            <a:ext cx="5582055" cy="2246769"/>
           </a:xfrm>
           <a:prstGeom prst="rect">
             <a:avLst/>
           </a:prstGeom>
           <a:noFill/>
-          <a:ln>
-            <a:noFill/>
-          </a:ln>
         </p:spPr>
         <p:txBody>
-          <a:bodyPr spcFirstLastPara="1" wrap="square" lIns="91425" tIns="45700" rIns="91425" bIns="45700" anchor="t" anchorCtr="0">
-            <a:normAutofit/>
+          <a:bodyPr wrap="square" rtlCol="0">
+            <a:spAutoFit/>
           </a:bodyPr>
           <a:lstStyle/>
           <a:p>
-            <a:pPr marL="457200" lvl="0" indent="-342900" algn="l" rtl="0">
-              <a:lnSpc>
-                <a:spcPct val="90000"/>
-              </a:lnSpc>
-              <a:spcBef>
-                <a:spcPts val="0"/>
-              </a:spcBef>
-              <a:spcAft>
-                <a:spcPts val="0"/>
-              </a:spcAft>
-              <a:buSzPts val="1800"/>
-              <a:buAutoNum type="arabicPeriod"/>
-            </a:pPr>
-            <a:endParaRPr sz="1800" dirty="0"/>
+            <a:r>
+              <a:rPr lang="ko-KR" altLang="en-US" dirty="0"/>
+              <a:t>회원 관리</a:t>
+            </a:r>
+            <a:r>
+              <a:rPr lang="en-US" altLang="ko-KR" dirty="0"/>
+              <a:t>(</a:t>
+            </a:r>
+            <a:r>
+              <a:rPr lang="ko-KR" altLang="en-US" dirty="0"/>
+              <a:t>검색을 통한 조회</a:t>
+            </a:r>
+            <a:r>
+              <a:rPr lang="en-US" altLang="ko-KR" dirty="0"/>
+              <a:t>, </a:t>
+            </a:r>
+            <a:r>
+              <a:rPr lang="ko-KR" altLang="en-US" dirty="0"/>
+              <a:t>정보 수정</a:t>
+            </a:r>
+            <a:r>
+              <a:rPr lang="en-US" altLang="ko-KR" dirty="0"/>
+              <a:t>, </a:t>
+            </a:r>
+            <a:r>
+              <a:rPr lang="ko-KR" altLang="en-US" dirty="0"/>
+              <a:t>비활성화</a:t>
+            </a:r>
+            <a:r>
+              <a:rPr lang="en-US" altLang="ko-KR" dirty="0"/>
+              <a:t>)</a:t>
+            </a:r>
+          </a:p>
+          <a:p>
+            <a:r>
+              <a:rPr lang="ko-KR" altLang="en-US" dirty="0" err="1"/>
+              <a:t>메인화면</a:t>
+            </a:r>
+            <a:r>
+              <a:rPr lang="ko-KR" altLang="en-US" dirty="0"/>
+              <a:t> 컨텐츠 관리</a:t>
+            </a:r>
+            <a:r>
+              <a:rPr lang="en-US" altLang="ko-KR" dirty="0"/>
+              <a:t>(</a:t>
+            </a:r>
+            <a:r>
+              <a:rPr lang="ko-KR" altLang="en-US" dirty="0"/>
+              <a:t>대관시설 설명 같은</a:t>
+            </a:r>
+            <a:r>
+              <a:rPr lang="en-US" altLang="ko-KR" dirty="0"/>
+              <a:t>..?)</a:t>
+            </a:r>
+          </a:p>
+          <a:p>
+            <a:r>
+              <a:rPr lang="en-US" altLang="ko-KR" dirty="0" err="1"/>
+              <a:t>QnA</a:t>
+            </a:r>
+            <a:r>
+              <a:rPr lang="en-US" altLang="ko-KR" dirty="0"/>
+              <a:t> </a:t>
+            </a:r>
+            <a:r>
+              <a:rPr lang="ko-KR" altLang="en-US" dirty="0"/>
+              <a:t>답변 기능</a:t>
+            </a:r>
+            <a:endParaRPr lang="en-US" altLang="ko-KR" dirty="0"/>
+          </a:p>
+          <a:p>
+            <a:r>
+              <a:rPr lang="ko-KR" altLang="en-US" dirty="0"/>
+              <a:t>공지사항</a:t>
+            </a:r>
+            <a:r>
+              <a:rPr lang="en-US" altLang="ko-KR" dirty="0"/>
+              <a:t>, FAQ </a:t>
+            </a:r>
+            <a:r>
+              <a:rPr lang="ko-KR" altLang="en-US" dirty="0"/>
+              <a:t>관리</a:t>
+            </a:r>
+            <a:endParaRPr lang="en-US" altLang="ko-KR" dirty="0"/>
+          </a:p>
+          <a:p>
+            <a:r>
+              <a:rPr lang="ko-KR" altLang="en-US" dirty="0"/>
+              <a:t>대관 관리</a:t>
+            </a:r>
+            <a:r>
+              <a:rPr lang="en-US" altLang="ko-KR" dirty="0"/>
+              <a:t>(</a:t>
+            </a:r>
+            <a:r>
+              <a:rPr lang="ko-KR" altLang="en-US" dirty="0"/>
+              <a:t>특정 </a:t>
+            </a:r>
+            <a:r>
+              <a:rPr lang="ko-KR" altLang="en-US" dirty="0" err="1"/>
+              <a:t>강연장</a:t>
+            </a:r>
+            <a:r>
+              <a:rPr lang="ko-KR" altLang="en-US" dirty="0"/>
+              <a:t> 시간 대별 예약자 확인</a:t>
+            </a:r>
+            <a:r>
+              <a:rPr lang="en-US" altLang="ko-KR" dirty="0"/>
+              <a:t>, </a:t>
+            </a:r>
+            <a:r>
+              <a:rPr lang="ko-KR" altLang="en-US" dirty="0"/>
+              <a:t>수정</a:t>
+            </a:r>
+            <a:r>
+              <a:rPr lang="en-US" altLang="ko-KR" dirty="0"/>
+              <a:t>, </a:t>
+            </a:r>
+            <a:r>
+              <a:rPr lang="ko-KR" altLang="en-US" dirty="0"/>
+              <a:t>삭제 가능</a:t>
+            </a:r>
+            <a:r>
+              <a:rPr lang="en-US" altLang="ko-KR" dirty="0"/>
+              <a:t>)</a:t>
+            </a:r>
+          </a:p>
+          <a:p>
+            <a:r>
+              <a:rPr lang="ko-KR" altLang="en-US" dirty="0"/>
+              <a:t>강연 예약관리</a:t>
+            </a:r>
+            <a:r>
+              <a:rPr lang="en-US" altLang="ko-KR" dirty="0"/>
+              <a:t>(</a:t>
+            </a:r>
+            <a:r>
+              <a:rPr lang="ko-KR" altLang="en-US" dirty="0"/>
+              <a:t>특정 강연 예약자 및 좌석 확인</a:t>
+            </a:r>
+            <a:r>
+              <a:rPr lang="en-US" altLang="ko-KR" dirty="0"/>
+              <a:t>)</a:t>
+            </a:r>
+          </a:p>
+          <a:p>
+            <a:endParaRPr lang="en-US" altLang="ko-KR" dirty="0"/>
+          </a:p>
+          <a:p>
+            <a:r>
+              <a:rPr lang="ko-KR" altLang="en-US" dirty="0" err="1"/>
+              <a:t>강연장</a:t>
+            </a:r>
+            <a:r>
+              <a:rPr lang="ko-KR" altLang="en-US" dirty="0"/>
+              <a:t> 정보 등록 및 수정</a:t>
+            </a:r>
+            <a:endParaRPr lang="en-US" altLang="ko-KR" dirty="0"/>
+          </a:p>
+          <a:p>
+            <a:endParaRPr lang="en-US" altLang="ko-KR" dirty="0"/>
+          </a:p>
+          <a:p>
+            <a:endParaRPr lang="ko-KR" altLang="en-US" dirty="0"/>
           </a:p>
         </p:txBody>
       </p:sp>

</xml_diff>